<commit_message>
2b1 Text und 3a fehlt
</commit_message>
<xml_diff>
--- a/Ex2/px.pptx
+++ b/Ex2/px.pptx
@@ -3372,6 +3372,201 @@
           </a:prstGeom>
         </p:spPr>
       </p:pic>
+      <p:cxnSp>
+        <p:nvCxnSpPr>
+          <p:cNvPr id="3" name="Gerader Verbinder 2">
+            <a:extLst>
+              <a:ext uri="{FF2B5EF4-FFF2-40B4-BE49-F238E27FC236}">
+                <a16:creationId xmlns:a16="http://schemas.microsoft.com/office/drawing/2014/main" id="{CED76922-34E0-4F80-89C4-042C3C0953B8}"/>
+              </a:ext>
+            </a:extLst>
+          </p:cNvPr>
+          <p:cNvCxnSpPr>
+            <a:stCxn id="38" idx="0"/>
+            <a:endCxn id="31" idx="2"/>
+          </p:cNvCxnSpPr>
+          <p:nvPr/>
+        </p:nvCxnSpPr>
+        <p:spPr>
+          <a:xfrm flipV="1">
+            <a:off x="6110288" y="2808159"/>
+            <a:ext cx="1044807" cy="311279"/>
+          </a:xfrm>
+          <a:prstGeom prst="line">
+            <a:avLst/>
+          </a:prstGeom>
+        </p:spPr>
+        <p:style>
+          <a:lnRef idx="1">
+            <a:schemeClr val="dk1"/>
+          </a:lnRef>
+          <a:fillRef idx="0">
+            <a:schemeClr val="dk1"/>
+          </a:fillRef>
+          <a:effectRef idx="0">
+            <a:schemeClr val="dk1"/>
+          </a:effectRef>
+          <a:fontRef idx="minor">
+            <a:schemeClr val="tx1"/>
+          </a:fontRef>
+        </p:style>
+      </p:cxnSp>
+      <p:cxnSp>
+        <p:nvCxnSpPr>
+          <p:cNvPr id="6" name="Gerader Verbinder 5">
+            <a:extLst>
+              <a:ext uri="{FF2B5EF4-FFF2-40B4-BE49-F238E27FC236}">
+                <a16:creationId xmlns:a16="http://schemas.microsoft.com/office/drawing/2014/main" id="{7B4BF747-C89B-4CE1-B6AF-E20E796BE960}"/>
+              </a:ext>
+            </a:extLst>
+          </p:cNvPr>
+          <p:cNvCxnSpPr>
+            <a:stCxn id="38" idx="4"/>
+            <a:endCxn id="31" idx="1"/>
+          </p:cNvCxnSpPr>
+          <p:nvPr/>
+        </p:nvCxnSpPr>
+        <p:spPr>
+          <a:xfrm>
+            <a:off x="6405563" y="2500313"/>
+            <a:ext cx="760076" cy="282390"/>
+          </a:xfrm>
+          <a:prstGeom prst="line">
+            <a:avLst/>
+          </a:prstGeom>
+        </p:spPr>
+        <p:style>
+          <a:lnRef idx="1">
+            <a:schemeClr val="dk1"/>
+          </a:lnRef>
+          <a:fillRef idx="0">
+            <a:schemeClr val="dk1"/>
+          </a:fillRef>
+          <a:effectRef idx="0">
+            <a:schemeClr val="dk1"/>
+          </a:effectRef>
+          <a:fontRef idx="minor">
+            <a:schemeClr val="tx1"/>
+          </a:fontRef>
+        </p:style>
+      </p:cxnSp>
+      <p:cxnSp>
+        <p:nvCxnSpPr>
+          <p:cNvPr id="39" name="Gerader Verbinder 38">
+            <a:extLst>
+              <a:ext uri="{FF2B5EF4-FFF2-40B4-BE49-F238E27FC236}">
+                <a16:creationId xmlns:a16="http://schemas.microsoft.com/office/drawing/2014/main" id="{34E1CB23-BF0E-465C-BAEA-21A42589980D}"/>
+              </a:ext>
+            </a:extLst>
+          </p:cNvPr>
+          <p:cNvCxnSpPr>
+            <a:stCxn id="38" idx="3"/>
+            <a:endCxn id="31" idx="1"/>
+          </p:cNvCxnSpPr>
+          <p:nvPr/>
+        </p:nvCxnSpPr>
+        <p:spPr>
+          <a:xfrm>
+            <a:off x="7034213" y="2181225"/>
+            <a:ext cx="131426" cy="601478"/>
+          </a:xfrm>
+          <a:prstGeom prst="line">
+            <a:avLst/>
+          </a:prstGeom>
+        </p:spPr>
+        <p:style>
+          <a:lnRef idx="1">
+            <a:schemeClr val="dk1"/>
+          </a:lnRef>
+          <a:fillRef idx="0">
+            <a:schemeClr val="dk1"/>
+          </a:fillRef>
+          <a:effectRef idx="0">
+            <a:schemeClr val="dk1"/>
+          </a:effectRef>
+          <a:fontRef idx="minor">
+            <a:schemeClr val="tx1"/>
+          </a:fontRef>
+        </p:style>
+      </p:cxnSp>
+      <p:cxnSp>
+        <p:nvCxnSpPr>
+          <p:cNvPr id="41" name="Gerader Verbinder 40">
+            <a:extLst>
+              <a:ext uri="{FF2B5EF4-FFF2-40B4-BE49-F238E27FC236}">
+                <a16:creationId xmlns:a16="http://schemas.microsoft.com/office/drawing/2014/main" id="{90D98999-6568-4608-A99C-9D3BAF9B27AE}"/>
+              </a:ext>
+            </a:extLst>
+          </p:cNvPr>
+          <p:cNvCxnSpPr>
+            <a:stCxn id="38" idx="2"/>
+            <a:endCxn id="31" idx="7"/>
+          </p:cNvCxnSpPr>
+          <p:nvPr/>
+        </p:nvCxnSpPr>
+        <p:spPr>
+          <a:xfrm flipH="1">
+            <a:off x="7216551" y="2495550"/>
+            <a:ext cx="751112" cy="287153"/>
+          </a:xfrm>
+          <a:prstGeom prst="line">
+            <a:avLst/>
+          </a:prstGeom>
+        </p:spPr>
+        <p:style>
+          <a:lnRef idx="1">
+            <a:schemeClr val="dk1"/>
+          </a:lnRef>
+          <a:fillRef idx="0">
+            <a:schemeClr val="dk1"/>
+          </a:fillRef>
+          <a:effectRef idx="0">
+            <a:schemeClr val="dk1"/>
+          </a:effectRef>
+          <a:fontRef idx="minor">
+            <a:schemeClr val="tx1"/>
+          </a:fontRef>
+        </p:style>
+      </p:cxnSp>
+      <p:cxnSp>
+        <p:nvCxnSpPr>
+          <p:cNvPr id="43" name="Gerader Verbinder 42">
+            <a:extLst>
+              <a:ext uri="{FF2B5EF4-FFF2-40B4-BE49-F238E27FC236}">
+                <a16:creationId xmlns:a16="http://schemas.microsoft.com/office/drawing/2014/main" id="{3F4470B0-0799-4FB0-9C3B-D9E154B0A2BA}"/>
+              </a:ext>
+            </a:extLst>
+          </p:cNvPr>
+          <p:cNvCxnSpPr>
+            <a:stCxn id="38" idx="1"/>
+            <a:endCxn id="31" idx="4"/>
+          </p:cNvCxnSpPr>
+          <p:nvPr/>
+        </p:nvCxnSpPr>
+        <p:spPr>
+          <a:xfrm flipH="1" flipV="1">
+            <a:off x="7191095" y="2844159"/>
+            <a:ext cx="147918" cy="584841"/>
+          </a:xfrm>
+          <a:prstGeom prst="line">
+            <a:avLst/>
+          </a:prstGeom>
+        </p:spPr>
+        <p:style>
+          <a:lnRef idx="1">
+            <a:schemeClr val="dk1"/>
+          </a:lnRef>
+          <a:fillRef idx="0">
+            <a:schemeClr val="dk1"/>
+          </a:fillRef>
+          <a:effectRef idx="0">
+            <a:schemeClr val="dk1"/>
+          </a:effectRef>
+          <a:fontRef idx="minor">
+            <a:schemeClr val="tx1"/>
+          </a:fontRef>
+        </p:style>
+      </p:cxnSp>
       <p:sp>
         <p:nvSpPr>
           <p:cNvPr id="8" name="Textfeld 7">
@@ -4672,7 +4867,212 @@
           <a:lstStyle/>
           <a:p>
             <a:pPr algn="ctr"/>
-            <a:endParaRPr lang="de-DE"/>
+            <a:endParaRPr lang="de-DE" dirty="0"/>
+          </a:p>
+        </p:txBody>
+      </p:sp>
+      <p:sp>
+        <p:nvSpPr>
+          <p:cNvPr id="44" name="Textfeld 43">
+            <a:extLst>
+              <a:ext uri="{FF2B5EF4-FFF2-40B4-BE49-F238E27FC236}">
+                <a16:creationId xmlns:a16="http://schemas.microsoft.com/office/drawing/2014/main" id="{EF473FEA-44E8-459E-823F-E93B3FD8F56B}"/>
+              </a:ext>
+            </a:extLst>
+          </p:cNvPr>
+          <p:cNvSpPr txBox="1"/>
+          <p:nvPr/>
+        </p:nvSpPr>
+        <p:spPr>
+          <a:xfrm>
+            <a:off x="6718862" y="2362111"/>
+            <a:ext cx="301686" cy="246221"/>
+          </a:xfrm>
+          <a:prstGeom prst="rect">
+            <a:avLst/>
+          </a:prstGeom>
+          <a:solidFill>
+            <a:schemeClr val="bg1"/>
+          </a:solidFill>
+        </p:spPr>
+        <p:txBody>
+          <a:bodyPr wrap="none" rtlCol="0">
+            <a:spAutoFit/>
+          </a:bodyPr>
+          <a:lstStyle/>
+          <a:p>
+            <a:r>
+              <a:rPr lang="de-DE" sz="1000" dirty="0"/>
+              <a:t>A</a:t>
+            </a:r>
+            <a:r>
+              <a:rPr lang="de-DE" sz="1000" baseline="-25000" dirty="0"/>
+              <a:t>1</a:t>
+            </a:r>
+          </a:p>
+        </p:txBody>
+      </p:sp>
+      <p:sp>
+        <p:nvSpPr>
+          <p:cNvPr id="45" name="Textfeld 44">
+            <a:extLst>
+              <a:ext uri="{FF2B5EF4-FFF2-40B4-BE49-F238E27FC236}">
+                <a16:creationId xmlns:a16="http://schemas.microsoft.com/office/drawing/2014/main" id="{5AB7EF76-37EA-4761-B4A3-5A8A6E1462AA}"/>
+              </a:ext>
+            </a:extLst>
+          </p:cNvPr>
+          <p:cNvSpPr txBox="1"/>
+          <p:nvPr/>
+        </p:nvSpPr>
+        <p:spPr>
+          <a:xfrm>
+            <a:off x="7182391" y="2381485"/>
+            <a:ext cx="301686" cy="246221"/>
+          </a:xfrm>
+          <a:prstGeom prst="rect">
+            <a:avLst/>
+          </a:prstGeom>
+          <a:solidFill>
+            <a:schemeClr val="bg1"/>
+          </a:solidFill>
+        </p:spPr>
+        <p:txBody>
+          <a:bodyPr wrap="none" rtlCol="0">
+            <a:spAutoFit/>
+          </a:bodyPr>
+          <a:lstStyle/>
+          <a:p>
+            <a:r>
+              <a:rPr lang="de-DE" sz="1000" dirty="0"/>
+              <a:t>A</a:t>
+            </a:r>
+            <a:r>
+              <a:rPr lang="de-DE" sz="1000" baseline="-25000" dirty="0"/>
+              <a:t>0</a:t>
+            </a:r>
+          </a:p>
+        </p:txBody>
+      </p:sp>
+      <p:sp>
+        <p:nvSpPr>
+          <p:cNvPr id="46" name="Textfeld 45">
+            <a:extLst>
+              <a:ext uri="{FF2B5EF4-FFF2-40B4-BE49-F238E27FC236}">
+                <a16:creationId xmlns:a16="http://schemas.microsoft.com/office/drawing/2014/main" id="{D5854EA1-3688-4E9E-A7B9-04217C761871}"/>
+              </a:ext>
+            </a:extLst>
+          </p:cNvPr>
+          <p:cNvSpPr txBox="1"/>
+          <p:nvPr/>
+        </p:nvSpPr>
+        <p:spPr>
+          <a:xfrm>
+            <a:off x="6376338" y="2654048"/>
+            <a:ext cx="301686" cy="246221"/>
+          </a:xfrm>
+          <a:prstGeom prst="rect">
+            <a:avLst/>
+          </a:prstGeom>
+          <a:solidFill>
+            <a:schemeClr val="bg1"/>
+          </a:solidFill>
+        </p:spPr>
+        <p:txBody>
+          <a:bodyPr wrap="none" rtlCol="0">
+            <a:spAutoFit/>
+          </a:bodyPr>
+          <a:lstStyle/>
+          <a:p>
+            <a:r>
+              <a:rPr lang="de-DE" sz="1000" dirty="0"/>
+              <a:t>A</a:t>
+            </a:r>
+            <a:r>
+              <a:rPr lang="de-DE" sz="1000" baseline="-25000" dirty="0"/>
+              <a:t>2</a:t>
+            </a:r>
+          </a:p>
+        </p:txBody>
+      </p:sp>
+      <p:sp>
+        <p:nvSpPr>
+          <p:cNvPr id="47" name="Textfeld 46">
+            <a:extLst>
+              <a:ext uri="{FF2B5EF4-FFF2-40B4-BE49-F238E27FC236}">
+                <a16:creationId xmlns:a16="http://schemas.microsoft.com/office/drawing/2014/main" id="{D84E34D8-F240-4B4B-A85B-64A4C34DC0D2}"/>
+              </a:ext>
+            </a:extLst>
+          </p:cNvPr>
+          <p:cNvSpPr txBox="1"/>
+          <p:nvPr/>
+        </p:nvSpPr>
+        <p:spPr>
+          <a:xfrm>
+            <a:off x="6750804" y="3001773"/>
+            <a:ext cx="301686" cy="246221"/>
+          </a:xfrm>
+          <a:prstGeom prst="rect">
+            <a:avLst/>
+          </a:prstGeom>
+          <a:solidFill>
+            <a:schemeClr val="bg1"/>
+          </a:solidFill>
+        </p:spPr>
+        <p:txBody>
+          <a:bodyPr wrap="none" rtlCol="0">
+            <a:spAutoFit/>
+          </a:bodyPr>
+          <a:lstStyle/>
+          <a:p>
+            <a:r>
+              <a:rPr lang="de-DE" sz="1000" dirty="0"/>
+              <a:t>A</a:t>
+            </a:r>
+            <a:r>
+              <a:rPr lang="de-DE" sz="1000" baseline="-25000" dirty="0"/>
+              <a:t>3</a:t>
+            </a:r>
+          </a:p>
+        </p:txBody>
+      </p:sp>
+      <p:sp>
+        <p:nvSpPr>
+          <p:cNvPr id="48" name="Textfeld 47">
+            <a:extLst>
+              <a:ext uri="{FF2B5EF4-FFF2-40B4-BE49-F238E27FC236}">
+                <a16:creationId xmlns:a16="http://schemas.microsoft.com/office/drawing/2014/main" id="{58A477EF-E430-4D8B-A8AB-F1F4C6FB47B3}"/>
+              </a:ext>
+            </a:extLst>
+          </p:cNvPr>
+          <p:cNvSpPr txBox="1"/>
+          <p:nvPr/>
+        </p:nvSpPr>
+        <p:spPr>
+          <a:xfrm>
+            <a:off x="7289826" y="2752318"/>
+            <a:ext cx="301686" cy="246221"/>
+          </a:xfrm>
+          <a:prstGeom prst="rect">
+            <a:avLst/>
+          </a:prstGeom>
+          <a:solidFill>
+            <a:schemeClr val="bg1"/>
+          </a:solidFill>
+        </p:spPr>
+        <p:txBody>
+          <a:bodyPr wrap="none" rtlCol="0">
+            <a:spAutoFit/>
+          </a:bodyPr>
+          <a:lstStyle/>
+          <a:p>
+            <a:r>
+              <a:rPr lang="de-DE" sz="1000" dirty="0"/>
+              <a:t>A</a:t>
+            </a:r>
+            <a:r>
+              <a:rPr lang="de-DE" sz="1000" baseline="-25000" dirty="0"/>
+              <a:t>4</a:t>
+            </a:r>
           </a:p>
         </p:txBody>
       </p:sp>

</xml_diff>